<commit_message>
sorted folders/files and created final_data
</commit_message>
<xml_diff>
--- a/presentation/sandpile_presentation.pptx
+++ b/presentation/sandpile_presentation.pptx
@@ -6,6 +6,7 @@
   </p:sldMasterIdLst>
   <p:sldIdLst>
     <p:sldId id="256" r:id="rId2"/>
+    <p:sldId id="257" r:id="rId3"/>
   </p:sldIdLst>
   <p:sldSz cx="12192000" cy="6858000"/>
   <p:notesSz cx="6858000" cy="9144000"/>
@@ -110,6 +111,58 @@
     </p:ext>
   </p:extLst>
 </p:presentation>
+</file>
+
+<file path=ppt/revisionInfo.xml><?xml version="1.0" encoding="utf-8"?>
+<p1510:revInfo xmlns:a="http://schemas.openxmlformats.org/drawingml/2006/main" xmlns:r="http://schemas.openxmlformats.org/officeDocument/2006/relationships" xmlns:p1510="http://schemas.microsoft.com/office/powerpoint/2015/10/main">
+  <p1510:revLst>
+    <p1510:client id="{0922AEC4-DB8B-493D-8645-9F00D4F9C7B1}" v="14" dt="2024-03-20T10:48:31.069"/>
+  </p1510:revLst>
+</p1510:revInfo>
+</file>
+
+<file path=ppt/changesInfos/changesInfo1.xml><?xml version="1.0" encoding="utf-8"?>
+<pc:chgInfo xmlns:a="http://schemas.openxmlformats.org/drawingml/2006/main" xmlns:r="http://schemas.openxmlformats.org/officeDocument/2006/relationships" xmlns:ac="http://schemas.microsoft.com/office/drawing/2013/main/command" xmlns:pc="http://schemas.microsoft.com/office/powerpoint/2013/main/command">
+  <pc:docChgLst>
+    <pc:chgData name="Malena Held" userId="79e6395605f2fdc5" providerId="Windows Live" clId="Web-{0922AEC4-DB8B-493D-8645-9F00D4F9C7B1}"/>
+    <pc:docChg chg="addSld modSld">
+      <pc:chgData name="Malena Held" userId="79e6395605f2fdc5" providerId="Windows Live" clId="Web-{0922AEC4-DB8B-493D-8645-9F00D4F9C7B1}" dt="2024-03-20T10:48:29.835" v="11" actId="20577"/>
+      <pc:docMkLst>
+        <pc:docMk/>
+      </pc:docMkLst>
+      <pc:sldChg chg="modSp">
+        <pc:chgData name="Malena Held" userId="79e6395605f2fdc5" providerId="Windows Live" clId="Web-{0922AEC4-DB8B-493D-8645-9F00D4F9C7B1}" dt="2024-03-20T10:48:17.147" v="6" actId="20577"/>
+        <pc:sldMkLst>
+          <pc:docMk/>
+          <pc:sldMk cId="1577499883" sldId="256"/>
+        </pc:sldMkLst>
+        <pc:spChg chg="mod">
+          <ac:chgData name="Malena Held" userId="79e6395605f2fdc5" providerId="Windows Live" clId="Web-{0922AEC4-DB8B-493D-8645-9F00D4F9C7B1}" dt="2024-03-20T10:48:17.147" v="6" actId="20577"/>
+          <ac:spMkLst>
+            <pc:docMk/>
+            <pc:sldMk cId="1577499883" sldId="256"/>
+            <ac:spMk id="2" creationId="{00000000-0000-0000-0000-000000000000}"/>
+          </ac:spMkLst>
+        </pc:spChg>
+      </pc:sldChg>
+      <pc:sldChg chg="modSp new">
+        <pc:chgData name="Malena Held" userId="79e6395605f2fdc5" providerId="Windows Live" clId="Web-{0922AEC4-DB8B-493D-8645-9F00D4F9C7B1}" dt="2024-03-20T10:48:29.835" v="11" actId="20577"/>
+        <pc:sldMkLst>
+          <pc:docMk/>
+          <pc:sldMk cId="2319239730" sldId="257"/>
+        </pc:sldMkLst>
+        <pc:spChg chg="mod">
+          <ac:chgData name="Malena Held" userId="79e6395605f2fdc5" providerId="Windows Live" clId="Web-{0922AEC4-DB8B-493D-8645-9F00D4F9C7B1}" dt="2024-03-20T10:48:29.835" v="11" actId="20577"/>
+          <ac:spMkLst>
+            <pc:docMk/>
+            <pc:sldMk cId="2319239730" sldId="257"/>
+            <ac:spMk id="2" creationId="{DA9407CF-49D9-5BAB-E56E-65A0F58555D6}"/>
+          </ac:spMkLst>
+        </pc:spChg>
+      </pc:sldChg>
+    </pc:docChg>
+  </pc:docChgLst>
+</pc:chgInfo>
 </file>
 
 <file path=ppt/slideLayouts/slideLayout1.xml><?xml version="1.0" encoding="utf-8"?>
@@ -2963,7 +3016,14 @@
           <a:bodyPr/>
           <a:lstStyle/>
           <a:p>
-            <a:endParaRPr lang="de-DE"/>
+            <a:r>
+              <a:rPr lang="de-DE" dirty="0" err="1">
+                <a:ea typeface="Calibri Light"/>
+                <a:cs typeface="Calibri Light"/>
+              </a:rPr>
+              <a:t>Sandpile</a:t>
+            </a:r>
+            <a:endParaRPr lang="de-DE" dirty="0" err="1"/>
           </a:p>
         </p:txBody>
       </p:sp>
@@ -2990,6 +3050,93 @@
     <p:extLst>
       <p:ext uri="{BB962C8B-B14F-4D97-AF65-F5344CB8AC3E}">
         <p14:creationId xmlns:p14="http://schemas.microsoft.com/office/powerpoint/2010/main" val="1577499883"/>
+      </p:ext>
+    </p:extLst>
+  </p:cSld>
+  <p:clrMapOvr>
+    <a:masterClrMapping/>
+  </p:clrMapOvr>
+</p:sld>
+</file>
+
+<file path=ppt/slides/slide2.xml><?xml version="1.0" encoding="utf-8"?>
+<p:sld xmlns:a="http://schemas.openxmlformats.org/drawingml/2006/main" xmlns:r="http://schemas.openxmlformats.org/officeDocument/2006/relationships" xmlns:p="http://schemas.openxmlformats.org/presentationml/2006/main">
+  <p:cSld>
+    <p:spTree>
+      <p:nvGrpSpPr>
+        <p:cNvPr id="1" name=""/>
+        <p:cNvGrpSpPr/>
+        <p:nvPr/>
+      </p:nvGrpSpPr>
+      <p:grpSpPr>
+        <a:xfrm>
+          <a:off x="0" y="0"/>
+          <a:ext cx="0" cy="0"/>
+          <a:chOff x="0" y="0"/>
+          <a:chExt cx="0" cy="0"/>
+        </a:xfrm>
+      </p:grpSpPr>
+      <p:sp>
+        <p:nvSpPr>
+          <p:cNvPr id="2" name="Titel 1">
+            <a:extLst>
+              <a:ext uri="{FF2B5EF4-FFF2-40B4-BE49-F238E27FC236}">
+                <a16:creationId xmlns:a16="http://schemas.microsoft.com/office/drawing/2014/main" id="{DA9407CF-49D9-5BAB-E56E-65A0F58555D6}"/>
+              </a:ext>
+            </a:extLst>
+          </p:cNvPr>
+          <p:cNvSpPr>
+            <a:spLocks noGrp="1"/>
+          </p:cNvSpPr>
+          <p:nvPr>
+            <p:ph type="title"/>
+          </p:nvPr>
+        </p:nvSpPr>
+        <p:spPr/>
+        <p:txBody>
+          <a:bodyPr/>
+          <a:lstStyle/>
+          <a:p>
+            <a:r>
+              <a:rPr lang="de-DE" dirty="0">
+                <a:ea typeface="Calibri Light"/>
+                <a:cs typeface="Calibri Light"/>
+              </a:rPr>
+              <a:t>Outline</a:t>
+            </a:r>
+            <a:endParaRPr lang="de-DE" dirty="0"/>
+          </a:p>
+        </p:txBody>
+      </p:sp>
+      <p:sp>
+        <p:nvSpPr>
+          <p:cNvPr id="3" name="Inhaltsplatzhalter 2">
+            <a:extLst>
+              <a:ext uri="{FF2B5EF4-FFF2-40B4-BE49-F238E27FC236}">
+                <a16:creationId xmlns:a16="http://schemas.microsoft.com/office/drawing/2014/main" id="{F72FEA5E-64CF-F739-05EB-54A875A23C9E}"/>
+              </a:ext>
+            </a:extLst>
+          </p:cNvPr>
+          <p:cNvSpPr>
+            <a:spLocks noGrp="1"/>
+          </p:cNvSpPr>
+          <p:nvPr>
+            <p:ph idx="1"/>
+          </p:nvPr>
+        </p:nvSpPr>
+        <p:spPr/>
+        <p:txBody>
+          <a:bodyPr/>
+          <a:lstStyle/>
+          <a:p>
+            <a:endParaRPr lang="de-DE"/>
+          </a:p>
+        </p:txBody>
+      </p:sp>
+    </p:spTree>
+    <p:extLst>
+      <p:ext uri="{BB962C8B-B14F-4D97-AF65-F5344CB8AC3E}">
+        <p14:creationId xmlns:p14="http://schemas.microsoft.com/office/powerpoint/2010/main" val="2319239730"/>
       </p:ext>
     </p:extLst>
   </p:cSld>

</xml_diff>